<commit_message>
encoding과 decoding을 왜 함? 안 함여
</commit_message>
<xml_diff>
--- a/MALM architecture.pptx
+++ b/MALM architecture.pptx
@@ -105,6 +105,11 @@
       </a:defRPr>
     </a:lvl9pPr>
   </p:defaultTextStyle>
+  <p:extLst>
+    <p:ext uri="{EFAFB233-063F-42B5-8137-9DF3F51BA10A}">
+      <p15:sldGuideLst xmlns:p15="http://schemas.microsoft.com/office/powerpoint/2012/main"/>
+    </p:ext>
+  </p:extLst>
 </p:presentation>
 </file>
 
@@ -3576,7 +3581,7 @@
         <p:spPr>
           <a:xfrm>
             <a:off x="2961337" y="2191265"/>
-            <a:ext cx="7731377" cy="2734962"/>
+            <a:ext cx="5902577" cy="2734962"/>
           </a:xfrm>
           <a:prstGeom prst="rect">
             <a:avLst/>
@@ -3692,8 +3697,8 @@
           <a:p>
             <a:pPr algn="ctr"/>
             <a:r>
-              <a:rPr lang="en-US" altLang="ko-KR" dirty="0" smtClean="0"/>
-              <a:t>decoder</a:t>
+              <a:rPr lang="en-US" altLang="ko-KR" dirty="0" err="1"/>
+              <a:t>responselist</a:t>
             </a:r>
             <a:endParaRPr lang="ko-KR" altLang="en-US" dirty="0"/>
           </a:p>
@@ -3950,10 +3955,10 @@
           <a:p>
             <a:pPr algn="ctr"/>
             <a:r>
-              <a:rPr lang="en-US" altLang="ko-KR" dirty="0" err="1" smtClean="0"/>
-              <a:t>responselist</a:t>
-            </a:r>
-            <a:endParaRPr lang="ko-KR" altLang="en-US" dirty="0" smtClean="0"/>
+              <a:rPr lang="en-US" altLang="ko-KR" dirty="0"/>
+              <a:t>announce</a:t>
+            </a:r>
+            <a:endParaRPr lang="ko-KR" altLang="en-US" dirty="0"/>
           </a:p>
         </p:txBody>
       </p:sp>
@@ -3994,8 +3999,8 @@
           <a:p>
             <a:pPr algn="ctr"/>
             <a:r>
-              <a:rPr lang="en-US" altLang="ko-KR" dirty="0" smtClean="0"/>
-              <a:t>encoder</a:t>
+              <a:rPr lang="en-US" altLang="ko-KR" dirty="0"/>
+              <a:t>synthesize</a:t>
             </a:r>
             <a:endParaRPr lang="ko-KR" altLang="en-US" dirty="0"/>
           </a:p>
@@ -4118,166 +4123,6 @@
         <p:spPr>
           <a:xfrm flipH="1">
             <a:off x="6601433" y="4198473"/>
-            <a:ext cx="532374" cy="0"/>
-          </a:xfrm>
-          <a:prstGeom prst="straightConnector1">
-            <a:avLst/>
-          </a:prstGeom>
-          <a:ln>
-            <a:tailEnd type="triangle"/>
-          </a:ln>
-        </p:spPr>
-        <p:style>
-          <a:lnRef idx="1">
-            <a:schemeClr val="dk1"/>
-          </a:lnRef>
-          <a:fillRef idx="0">
-            <a:schemeClr val="dk1"/>
-          </a:fillRef>
-          <a:effectRef idx="0">
-            <a:schemeClr val="dk1"/>
-          </a:effectRef>
-          <a:fontRef idx="minor">
-            <a:schemeClr val="tx1"/>
-          </a:fontRef>
-        </p:style>
-      </p:cxnSp>
-      <p:sp>
-        <p:nvSpPr>
-          <p:cNvPr id="42" name="직사각형 41"/>
-          <p:cNvSpPr/>
-          <p:nvPr/>
-        </p:nvSpPr>
-        <p:spPr>
-          <a:xfrm>
-            <a:off x="9081606" y="2840642"/>
-            <a:ext cx="1415425" cy="708454"/>
-          </a:xfrm>
-          <a:prstGeom prst="rect">
-            <a:avLst/>
-          </a:prstGeom>
-        </p:spPr>
-        <p:style>
-          <a:lnRef idx="2">
-            <a:schemeClr val="accent1">
-              <a:shade val="50000"/>
-            </a:schemeClr>
-          </a:lnRef>
-          <a:fillRef idx="1">
-            <a:schemeClr val="accent1"/>
-          </a:fillRef>
-          <a:effectRef idx="0">
-            <a:schemeClr val="accent1"/>
-          </a:effectRef>
-          <a:fontRef idx="minor">
-            <a:schemeClr val="lt1"/>
-          </a:fontRef>
-        </p:style>
-        <p:txBody>
-          <a:bodyPr rtlCol="0" anchor="ctr"/>
-          <a:lstStyle/>
-          <a:p>
-            <a:pPr algn="ctr"/>
-            <a:r>
-              <a:rPr lang="en-US" altLang="ko-KR" dirty="0" smtClean="0"/>
-              <a:t>announce</a:t>
-            </a:r>
-            <a:endParaRPr lang="ko-KR" altLang="en-US" dirty="0" smtClean="0"/>
-          </a:p>
-        </p:txBody>
-      </p:sp>
-      <p:sp>
-        <p:nvSpPr>
-          <p:cNvPr id="43" name="직사각형 42"/>
-          <p:cNvSpPr/>
-          <p:nvPr/>
-        </p:nvSpPr>
-        <p:spPr>
-          <a:xfrm>
-            <a:off x="9081606" y="3844246"/>
-            <a:ext cx="1415425" cy="708454"/>
-          </a:xfrm>
-          <a:prstGeom prst="rect">
-            <a:avLst/>
-          </a:prstGeom>
-        </p:spPr>
-        <p:style>
-          <a:lnRef idx="2">
-            <a:schemeClr val="accent1">
-              <a:shade val="50000"/>
-            </a:schemeClr>
-          </a:lnRef>
-          <a:fillRef idx="1">
-            <a:schemeClr val="accent1"/>
-          </a:fillRef>
-          <a:effectRef idx="0">
-            <a:schemeClr val="accent1"/>
-          </a:effectRef>
-          <a:fontRef idx="minor">
-            <a:schemeClr val="lt1"/>
-          </a:fontRef>
-        </p:style>
-        <p:txBody>
-          <a:bodyPr rtlCol="0" anchor="ctr"/>
-          <a:lstStyle/>
-          <a:p>
-            <a:pPr algn="ctr"/>
-            <a:r>
-              <a:rPr lang="en-US" altLang="ko-KR" dirty="0" smtClean="0"/>
-              <a:t>synthesize</a:t>
-            </a:r>
-            <a:endParaRPr lang="ko-KR" altLang="en-US" dirty="0"/>
-          </a:p>
-        </p:txBody>
-      </p:sp>
-      <p:cxnSp>
-        <p:nvCxnSpPr>
-          <p:cNvPr id="44" name="직선 화살표 연결선 43"/>
-          <p:cNvCxnSpPr>
-            <a:stCxn id="24" idx="3"/>
-            <a:endCxn id="42" idx="1"/>
-          </p:cNvCxnSpPr>
-          <p:nvPr/>
-        </p:nvCxnSpPr>
-        <p:spPr>
-          <a:xfrm>
-            <a:off x="8549232" y="3194869"/>
-            <a:ext cx="532374" cy="0"/>
-          </a:xfrm>
-          <a:prstGeom prst="straightConnector1">
-            <a:avLst/>
-          </a:prstGeom>
-          <a:ln>
-            <a:tailEnd type="triangle"/>
-          </a:ln>
-        </p:spPr>
-        <p:style>
-          <a:lnRef idx="1">
-            <a:schemeClr val="dk1"/>
-          </a:lnRef>
-          <a:fillRef idx="0">
-            <a:schemeClr val="dk1"/>
-          </a:fillRef>
-          <a:effectRef idx="0">
-            <a:schemeClr val="dk1"/>
-          </a:effectRef>
-          <a:fontRef idx="minor">
-            <a:schemeClr val="tx1"/>
-          </a:fontRef>
-        </p:style>
-      </p:cxnSp>
-      <p:cxnSp>
-        <p:nvCxnSpPr>
-          <p:cNvPr id="45" name="직선 화살표 연결선 44"/>
-          <p:cNvCxnSpPr>
-            <a:stCxn id="43" idx="1"/>
-            <a:endCxn id="25" idx="3"/>
-          </p:cNvCxnSpPr>
-          <p:nvPr/>
-        </p:nvCxnSpPr>
-        <p:spPr>
-          <a:xfrm flipH="1">
-            <a:off x="8549232" y="4198473"/>
             <a:ext cx="532374" cy="0"/>
           </a:xfrm>
           <a:prstGeom prst="straightConnector1">

</xml_diff>

<commit_message>
socket lib 다시 공부함
</commit_message>
<xml_diff>
--- a/MALM architecture.pptx
+++ b/MALM architecture.pptx
@@ -244,7 +244,7 @@
           <a:p>
             <a:fld id="{4069A885-E4D2-42EA-9375-43751F394703}" type="datetimeFigureOut">
               <a:rPr lang="ko-KR" altLang="en-US" smtClean="0"/>
-              <a:t>2015-12-07</a:t>
+              <a:t>2015-12-08</a:t>
             </a:fld>
             <a:endParaRPr lang="ko-KR" altLang="en-US"/>
           </a:p>
@@ -414,7 +414,7 @@
           <a:p>
             <a:fld id="{4069A885-E4D2-42EA-9375-43751F394703}" type="datetimeFigureOut">
               <a:rPr lang="ko-KR" altLang="en-US" smtClean="0"/>
-              <a:t>2015-12-07</a:t>
+              <a:t>2015-12-08</a:t>
             </a:fld>
             <a:endParaRPr lang="ko-KR" altLang="en-US"/>
           </a:p>
@@ -594,7 +594,7 @@
           <a:p>
             <a:fld id="{4069A885-E4D2-42EA-9375-43751F394703}" type="datetimeFigureOut">
               <a:rPr lang="ko-KR" altLang="en-US" smtClean="0"/>
-              <a:t>2015-12-07</a:t>
+              <a:t>2015-12-08</a:t>
             </a:fld>
             <a:endParaRPr lang="ko-KR" altLang="en-US"/>
           </a:p>
@@ -764,7 +764,7 @@
           <a:p>
             <a:fld id="{4069A885-E4D2-42EA-9375-43751F394703}" type="datetimeFigureOut">
               <a:rPr lang="ko-KR" altLang="en-US" smtClean="0"/>
-              <a:t>2015-12-07</a:t>
+              <a:t>2015-12-08</a:t>
             </a:fld>
             <a:endParaRPr lang="ko-KR" altLang="en-US"/>
           </a:p>
@@ -1010,7 +1010,7 @@
           <a:p>
             <a:fld id="{4069A885-E4D2-42EA-9375-43751F394703}" type="datetimeFigureOut">
               <a:rPr lang="ko-KR" altLang="en-US" smtClean="0"/>
-              <a:t>2015-12-07</a:t>
+              <a:t>2015-12-08</a:t>
             </a:fld>
             <a:endParaRPr lang="ko-KR" altLang="en-US"/>
           </a:p>
@@ -1242,7 +1242,7 @@
           <a:p>
             <a:fld id="{4069A885-E4D2-42EA-9375-43751F394703}" type="datetimeFigureOut">
               <a:rPr lang="ko-KR" altLang="en-US" smtClean="0"/>
-              <a:t>2015-12-07</a:t>
+              <a:t>2015-12-08</a:t>
             </a:fld>
             <a:endParaRPr lang="ko-KR" altLang="en-US"/>
           </a:p>
@@ -1609,7 +1609,7 @@
           <a:p>
             <a:fld id="{4069A885-E4D2-42EA-9375-43751F394703}" type="datetimeFigureOut">
               <a:rPr lang="ko-KR" altLang="en-US" smtClean="0"/>
-              <a:t>2015-12-07</a:t>
+              <a:t>2015-12-08</a:t>
             </a:fld>
             <a:endParaRPr lang="ko-KR" altLang="en-US"/>
           </a:p>
@@ -1727,7 +1727,7 @@
           <a:p>
             <a:fld id="{4069A885-E4D2-42EA-9375-43751F394703}" type="datetimeFigureOut">
               <a:rPr lang="ko-KR" altLang="en-US" smtClean="0"/>
-              <a:t>2015-12-07</a:t>
+              <a:t>2015-12-08</a:t>
             </a:fld>
             <a:endParaRPr lang="ko-KR" altLang="en-US"/>
           </a:p>
@@ -1822,7 +1822,7 @@
           <a:p>
             <a:fld id="{4069A885-E4D2-42EA-9375-43751F394703}" type="datetimeFigureOut">
               <a:rPr lang="ko-KR" altLang="en-US" smtClean="0"/>
-              <a:t>2015-12-07</a:t>
+              <a:t>2015-12-08</a:t>
             </a:fld>
             <a:endParaRPr lang="ko-KR" altLang="en-US"/>
           </a:p>
@@ -2099,7 +2099,7 @@
           <a:p>
             <a:fld id="{4069A885-E4D2-42EA-9375-43751F394703}" type="datetimeFigureOut">
               <a:rPr lang="ko-KR" altLang="en-US" smtClean="0"/>
-              <a:t>2015-12-07</a:t>
+              <a:t>2015-12-08</a:t>
             </a:fld>
             <a:endParaRPr lang="ko-KR" altLang="en-US"/>
           </a:p>
@@ -2352,7 +2352,7 @@
           <a:p>
             <a:fld id="{4069A885-E4D2-42EA-9375-43751F394703}" type="datetimeFigureOut">
               <a:rPr lang="ko-KR" altLang="en-US" smtClean="0"/>
-              <a:t>2015-12-07</a:t>
+              <a:t>2015-12-08</a:t>
             </a:fld>
             <a:endParaRPr lang="ko-KR" altLang="en-US"/>
           </a:p>
@@ -2565,7 +2565,7 @@
           <a:p>
             <a:fld id="{4069A885-E4D2-42EA-9375-43751F394703}" type="datetimeFigureOut">
               <a:rPr lang="ko-KR" altLang="en-US" smtClean="0"/>
-              <a:t>2015-12-07</a:t>
+              <a:t>2015-12-08</a:t>
             </a:fld>
             <a:endParaRPr lang="ko-KR" altLang="en-US"/>
           </a:p>
@@ -2987,51 +2987,11 @@
           <a:p>
             <a:r>
               <a:rPr lang="en-US" altLang="ko-KR" dirty="0" smtClean="0"/>
-              <a:t>MALM architecture</a:t>
-            </a:r>
-            <a:endParaRPr lang="ko-KR" altLang="en-US" dirty="0"/>
-          </a:p>
-        </p:txBody>
-      </p:sp>
-      <p:sp>
-        <p:nvSpPr>
-          <p:cNvPr id="4" name="직사각형 3"/>
-          <p:cNvSpPr/>
-          <p:nvPr/>
-        </p:nvSpPr>
-        <p:spPr>
-          <a:xfrm>
-            <a:off x="585093" y="2032089"/>
-            <a:ext cx="2240486" cy="3508344"/>
-          </a:xfrm>
-          <a:prstGeom prst="rect">
-            <a:avLst/>
-          </a:prstGeom>
-        </p:spPr>
-        <p:style>
-          <a:lnRef idx="2">
-            <a:schemeClr val="accent1">
-              <a:shade val="50000"/>
-            </a:schemeClr>
-          </a:lnRef>
-          <a:fillRef idx="1">
-            <a:schemeClr val="accent1"/>
-          </a:fillRef>
-          <a:effectRef idx="0">
-            <a:schemeClr val="accent1"/>
-          </a:effectRef>
-          <a:fontRef idx="minor">
-            <a:schemeClr val="lt1"/>
-          </a:fontRef>
-        </p:style>
-        <p:txBody>
-          <a:bodyPr rtlCol="0" anchor="t"/>
-          <a:lstStyle/>
-          <a:p>
-            <a:pPr algn="ctr"/>
+              <a:t>Server </a:t>
+            </a:r>
             <a:r>
               <a:rPr lang="en-US" altLang="ko-KR" dirty="0" smtClean="0"/>
-              <a:t>Thread Queue</a:t>
+              <a:t>architecture</a:t>
             </a:r>
             <a:endParaRPr lang="ko-KR" altLang="en-US" dirty="0"/>
           </a:p>
@@ -3045,7 +3005,7 @@
         </p:nvGrpSpPr>
         <p:grpSpPr>
           <a:xfrm>
-            <a:off x="912238" y="2760760"/>
+            <a:off x="3704865" y="2884328"/>
             <a:ext cx="1586196" cy="2528907"/>
             <a:chOff x="912238" y="2760760"/>
             <a:chExt cx="1586196" cy="2528907"/>
@@ -3089,7 +3049,7 @@
               <a:pPr algn="ctr"/>
               <a:r>
                 <a:rPr lang="en-US" altLang="ko-KR" dirty="0" smtClean="0"/>
-                <a:t>MalmServer1</a:t>
+                <a:t>Malm1</a:t>
               </a:r>
               <a:endParaRPr lang="ko-KR" altLang="en-US" dirty="0"/>
             </a:p>
@@ -3133,7 +3093,7 @@
               <a:pPr algn="ctr"/>
               <a:r>
                 <a:rPr lang="en-US" altLang="ko-KR" dirty="0" smtClean="0"/>
-                <a:t>MalmServer2</a:t>
+                <a:t>Malm2</a:t>
               </a:r>
               <a:endParaRPr lang="ko-KR" altLang="en-US" dirty="0"/>
             </a:p>
@@ -3177,7 +3137,7 @@
               <a:pPr algn="ctr"/>
               <a:r>
                 <a:rPr lang="en-US" altLang="ko-KR" dirty="0" smtClean="0"/>
-                <a:t>MalmServer3</a:t>
+                <a:t>Malm3</a:t>
               </a:r>
               <a:endParaRPr lang="ko-KR" altLang="en-US" dirty="0"/>
             </a:p>
@@ -3221,7 +3181,7 @@
               <a:pPr algn="ctr"/>
               <a:r>
                 <a:rPr lang="en-US" altLang="ko-KR" dirty="0" smtClean="0"/>
-                <a:t>MalmServer4</a:t>
+                <a:t>Malm4</a:t>
               </a:r>
               <a:endParaRPr lang="ko-KR" altLang="en-US" dirty="0"/>
             </a:p>
@@ -3236,7 +3196,7 @@
         </p:nvSpPr>
         <p:spPr>
           <a:xfrm>
-            <a:off x="3509437" y="3580424"/>
+            <a:off x="6302064" y="3703992"/>
             <a:ext cx="1919298" cy="988540"/>
           </a:xfrm>
           <a:prstGeom prst="rect">
@@ -3283,7 +3243,7 @@
         </p:nvCxnSpPr>
         <p:spPr>
           <a:xfrm>
-            <a:off x="2498434" y="3039763"/>
+            <a:off x="5291061" y="3163331"/>
             <a:ext cx="1011003" cy="1034931"/>
           </a:xfrm>
           <a:prstGeom prst="straightConnector1">
@@ -3320,7 +3280,7 @@
         </p:nvCxnSpPr>
         <p:spPr>
           <a:xfrm>
-            <a:off x="2498434" y="3696729"/>
+            <a:off x="5291061" y="3820297"/>
             <a:ext cx="1011003" cy="377965"/>
           </a:xfrm>
           <a:prstGeom prst="straightConnector1">
@@ -3357,7 +3317,7 @@
         </p:nvCxnSpPr>
         <p:spPr>
           <a:xfrm flipV="1">
-            <a:off x="2498434" y="4074694"/>
+            <a:off x="5291061" y="4198262"/>
             <a:ext cx="1011003" cy="279003"/>
           </a:xfrm>
           <a:prstGeom prst="straightConnector1">
@@ -3394,7 +3354,7 @@
         </p:nvCxnSpPr>
         <p:spPr>
           <a:xfrm flipV="1">
-            <a:off x="2498434" y="4074694"/>
+            <a:off x="5291061" y="4198262"/>
             <a:ext cx="1011003" cy="935971"/>
           </a:xfrm>
           <a:prstGeom prst="straightConnector1">
@@ -3508,6 +3468,425 @@
           </a:p>
         </p:txBody>
       </p:sp>
+      <p:sp>
+        <p:nvSpPr>
+          <p:cNvPr id="16" name="직사각형 15"/>
+          <p:cNvSpPr/>
+          <p:nvPr/>
+        </p:nvSpPr>
+        <p:spPr>
+          <a:xfrm>
+            <a:off x="402587" y="2884327"/>
+            <a:ext cx="2111228" cy="2249906"/>
+          </a:xfrm>
+          <a:prstGeom prst="rect">
+            <a:avLst/>
+          </a:prstGeom>
+        </p:spPr>
+        <p:style>
+          <a:lnRef idx="2">
+            <a:schemeClr val="accent1">
+              <a:shade val="50000"/>
+            </a:schemeClr>
+          </a:lnRef>
+          <a:fillRef idx="1">
+            <a:schemeClr val="accent1"/>
+          </a:fillRef>
+          <a:effectRef idx="0">
+            <a:schemeClr val="accent1"/>
+          </a:effectRef>
+          <a:fontRef idx="minor">
+            <a:schemeClr val="lt1"/>
+          </a:fontRef>
+        </p:style>
+        <p:txBody>
+          <a:bodyPr rtlCol="0" anchor="t"/>
+          <a:lstStyle/>
+          <a:p>
+            <a:pPr algn="ctr"/>
+            <a:r>
+              <a:rPr lang="en-US" altLang="ko-KR" dirty="0" smtClean="0"/>
+              <a:t>server</a:t>
+            </a:r>
+            <a:endParaRPr lang="ko-KR" altLang="en-US" dirty="0"/>
+          </a:p>
+        </p:txBody>
+      </p:sp>
+      <p:sp>
+        <p:nvSpPr>
+          <p:cNvPr id="20" name="직사각형 19"/>
+          <p:cNvSpPr/>
+          <p:nvPr/>
+        </p:nvSpPr>
+        <p:spPr>
+          <a:xfrm>
+            <a:off x="665103" y="3541295"/>
+            <a:ext cx="1586196" cy="558005"/>
+          </a:xfrm>
+          <a:prstGeom prst="rect">
+            <a:avLst/>
+          </a:prstGeom>
+        </p:spPr>
+        <p:style>
+          <a:lnRef idx="2">
+            <a:schemeClr val="accent1">
+              <a:shade val="50000"/>
+            </a:schemeClr>
+          </a:lnRef>
+          <a:fillRef idx="1">
+            <a:schemeClr val="accent1"/>
+          </a:fillRef>
+          <a:effectRef idx="0">
+            <a:schemeClr val="accent1"/>
+          </a:effectRef>
+          <a:fontRef idx="minor">
+            <a:schemeClr val="lt1"/>
+          </a:fontRef>
+        </p:style>
+        <p:txBody>
+          <a:bodyPr rtlCol="0" anchor="ctr"/>
+          <a:lstStyle/>
+          <a:p>
+            <a:pPr algn="ctr"/>
+            <a:r>
+              <a:rPr lang="en-US" altLang="ko-KR" dirty="0" smtClean="0"/>
+              <a:t>socket1</a:t>
+            </a:r>
+            <a:endParaRPr lang="ko-KR" altLang="en-US" dirty="0"/>
+          </a:p>
+        </p:txBody>
+      </p:sp>
+      <p:sp>
+        <p:nvSpPr>
+          <p:cNvPr id="21" name="직사각형 20"/>
+          <p:cNvSpPr/>
+          <p:nvPr/>
+        </p:nvSpPr>
+        <p:spPr>
+          <a:xfrm>
+            <a:off x="665103" y="4198262"/>
+            <a:ext cx="1586196" cy="558005"/>
+          </a:xfrm>
+          <a:prstGeom prst="rect">
+            <a:avLst/>
+          </a:prstGeom>
+        </p:spPr>
+        <p:style>
+          <a:lnRef idx="2">
+            <a:schemeClr val="accent1">
+              <a:shade val="50000"/>
+            </a:schemeClr>
+          </a:lnRef>
+          <a:fillRef idx="1">
+            <a:schemeClr val="accent1"/>
+          </a:fillRef>
+          <a:effectRef idx="0">
+            <a:schemeClr val="accent1"/>
+          </a:effectRef>
+          <a:fontRef idx="minor">
+            <a:schemeClr val="lt1"/>
+          </a:fontRef>
+        </p:style>
+        <p:txBody>
+          <a:bodyPr rtlCol="0" anchor="ctr"/>
+          <a:lstStyle/>
+          <a:p>
+            <a:pPr algn="ctr"/>
+            <a:r>
+              <a:rPr lang="en-US" altLang="ko-KR" dirty="0" smtClean="0"/>
+              <a:t>socket2</a:t>
+            </a:r>
+            <a:endParaRPr lang="ko-KR" altLang="en-US" dirty="0"/>
+          </a:p>
+        </p:txBody>
+      </p:sp>
+      <p:cxnSp>
+        <p:nvCxnSpPr>
+          <p:cNvPr id="11" name="직선 화살표 연결선 10"/>
+          <p:cNvCxnSpPr>
+            <a:stCxn id="20" idx="3"/>
+            <a:endCxn id="5" idx="1"/>
+          </p:cNvCxnSpPr>
+          <p:nvPr/>
+        </p:nvCxnSpPr>
+        <p:spPr>
+          <a:xfrm flipV="1">
+            <a:off x="2251299" y="3163331"/>
+            <a:ext cx="1453566" cy="656967"/>
+          </a:xfrm>
+          <a:prstGeom prst="straightConnector1">
+            <a:avLst/>
+          </a:prstGeom>
+          <a:ln>
+            <a:tailEnd type="triangle"/>
+          </a:ln>
+        </p:spPr>
+        <p:style>
+          <a:lnRef idx="1">
+            <a:schemeClr val="dk1"/>
+          </a:lnRef>
+          <a:fillRef idx="0">
+            <a:schemeClr val="dk1"/>
+          </a:fillRef>
+          <a:effectRef idx="0">
+            <a:schemeClr val="dk1"/>
+          </a:effectRef>
+          <a:fontRef idx="minor">
+            <a:schemeClr val="tx1"/>
+          </a:fontRef>
+        </p:style>
+      </p:cxnSp>
+      <p:cxnSp>
+        <p:nvCxnSpPr>
+          <p:cNvPr id="22" name="직선 화살표 연결선 21"/>
+          <p:cNvCxnSpPr>
+            <a:stCxn id="20" idx="3"/>
+            <a:endCxn id="6" idx="1"/>
+          </p:cNvCxnSpPr>
+          <p:nvPr/>
+        </p:nvCxnSpPr>
+        <p:spPr>
+          <a:xfrm flipV="1">
+            <a:off x="2251299" y="3820297"/>
+            <a:ext cx="1453566" cy="1"/>
+          </a:xfrm>
+          <a:prstGeom prst="straightConnector1">
+            <a:avLst/>
+          </a:prstGeom>
+          <a:ln>
+            <a:tailEnd type="triangle"/>
+          </a:ln>
+        </p:spPr>
+        <p:style>
+          <a:lnRef idx="1">
+            <a:schemeClr val="dk1"/>
+          </a:lnRef>
+          <a:fillRef idx="0">
+            <a:schemeClr val="dk1"/>
+          </a:fillRef>
+          <a:effectRef idx="0">
+            <a:schemeClr val="dk1"/>
+          </a:effectRef>
+          <a:fontRef idx="minor">
+            <a:schemeClr val="tx1"/>
+          </a:fontRef>
+        </p:style>
+      </p:cxnSp>
+      <p:cxnSp>
+        <p:nvCxnSpPr>
+          <p:cNvPr id="23" name="직선 화살표 연결선 22"/>
+          <p:cNvCxnSpPr>
+            <a:stCxn id="20" idx="3"/>
+            <a:endCxn id="7" idx="1"/>
+          </p:cNvCxnSpPr>
+          <p:nvPr/>
+        </p:nvCxnSpPr>
+        <p:spPr>
+          <a:xfrm>
+            <a:off x="2251299" y="3820298"/>
+            <a:ext cx="1453566" cy="656967"/>
+          </a:xfrm>
+          <a:prstGeom prst="straightConnector1">
+            <a:avLst/>
+          </a:prstGeom>
+          <a:ln>
+            <a:tailEnd type="triangle"/>
+          </a:ln>
+        </p:spPr>
+        <p:style>
+          <a:lnRef idx="1">
+            <a:schemeClr val="dk1"/>
+          </a:lnRef>
+          <a:fillRef idx="0">
+            <a:schemeClr val="dk1"/>
+          </a:fillRef>
+          <a:effectRef idx="0">
+            <a:schemeClr val="dk1"/>
+          </a:effectRef>
+          <a:fontRef idx="minor">
+            <a:schemeClr val="tx1"/>
+          </a:fontRef>
+        </p:style>
+      </p:cxnSp>
+      <p:cxnSp>
+        <p:nvCxnSpPr>
+          <p:cNvPr id="24" name="직선 화살표 연결선 23"/>
+          <p:cNvCxnSpPr>
+            <a:stCxn id="20" idx="3"/>
+            <a:endCxn id="8" idx="1"/>
+          </p:cNvCxnSpPr>
+          <p:nvPr/>
+        </p:nvCxnSpPr>
+        <p:spPr>
+          <a:xfrm>
+            <a:off x="2251299" y="3820298"/>
+            <a:ext cx="1453566" cy="1313935"/>
+          </a:xfrm>
+          <a:prstGeom prst="straightConnector1">
+            <a:avLst/>
+          </a:prstGeom>
+          <a:ln>
+            <a:tailEnd type="triangle"/>
+          </a:ln>
+        </p:spPr>
+        <p:style>
+          <a:lnRef idx="1">
+            <a:schemeClr val="dk1"/>
+          </a:lnRef>
+          <a:fillRef idx="0">
+            <a:schemeClr val="dk1"/>
+          </a:fillRef>
+          <a:effectRef idx="0">
+            <a:schemeClr val="dk1"/>
+          </a:effectRef>
+          <a:fontRef idx="minor">
+            <a:schemeClr val="tx1"/>
+          </a:fontRef>
+        </p:style>
+      </p:cxnSp>
+      <p:cxnSp>
+        <p:nvCxnSpPr>
+          <p:cNvPr id="25" name="직선 화살표 연결선 24"/>
+          <p:cNvCxnSpPr>
+            <a:stCxn id="21" idx="3"/>
+            <a:endCxn id="7" idx="1"/>
+          </p:cNvCxnSpPr>
+          <p:nvPr/>
+        </p:nvCxnSpPr>
+        <p:spPr>
+          <a:xfrm>
+            <a:off x="2251299" y="4477265"/>
+            <a:ext cx="1453566" cy="0"/>
+          </a:xfrm>
+          <a:prstGeom prst="straightConnector1">
+            <a:avLst/>
+          </a:prstGeom>
+          <a:ln>
+            <a:tailEnd type="triangle"/>
+          </a:ln>
+        </p:spPr>
+        <p:style>
+          <a:lnRef idx="1">
+            <a:schemeClr val="dk1"/>
+          </a:lnRef>
+          <a:fillRef idx="0">
+            <a:schemeClr val="dk1"/>
+          </a:fillRef>
+          <a:effectRef idx="0">
+            <a:schemeClr val="dk1"/>
+          </a:effectRef>
+          <a:fontRef idx="minor">
+            <a:schemeClr val="tx1"/>
+          </a:fontRef>
+        </p:style>
+      </p:cxnSp>
+      <p:cxnSp>
+        <p:nvCxnSpPr>
+          <p:cNvPr id="26" name="직선 화살표 연결선 25"/>
+          <p:cNvCxnSpPr>
+            <a:endCxn id="5" idx="1"/>
+          </p:cNvCxnSpPr>
+          <p:nvPr/>
+        </p:nvCxnSpPr>
+        <p:spPr>
+          <a:xfrm flipV="1">
+            <a:off x="2251299" y="3163331"/>
+            <a:ext cx="1453566" cy="1331933"/>
+          </a:xfrm>
+          <a:prstGeom prst="straightConnector1">
+            <a:avLst/>
+          </a:prstGeom>
+          <a:ln>
+            <a:tailEnd type="triangle"/>
+          </a:ln>
+        </p:spPr>
+        <p:style>
+          <a:lnRef idx="1">
+            <a:schemeClr val="dk1"/>
+          </a:lnRef>
+          <a:fillRef idx="0">
+            <a:schemeClr val="dk1"/>
+          </a:fillRef>
+          <a:effectRef idx="0">
+            <a:schemeClr val="dk1"/>
+          </a:effectRef>
+          <a:fontRef idx="minor">
+            <a:schemeClr val="tx1"/>
+          </a:fontRef>
+        </p:style>
+      </p:cxnSp>
+      <p:cxnSp>
+        <p:nvCxnSpPr>
+          <p:cNvPr id="27" name="직선 화살표 연결선 26"/>
+          <p:cNvCxnSpPr>
+            <a:stCxn id="21" idx="3"/>
+            <a:endCxn id="6" idx="1"/>
+          </p:cNvCxnSpPr>
+          <p:nvPr/>
+        </p:nvCxnSpPr>
+        <p:spPr>
+          <a:xfrm flipV="1">
+            <a:off x="2251299" y="3820297"/>
+            <a:ext cx="1453566" cy="656968"/>
+          </a:xfrm>
+          <a:prstGeom prst="straightConnector1">
+            <a:avLst/>
+          </a:prstGeom>
+          <a:ln>
+            <a:tailEnd type="triangle"/>
+          </a:ln>
+        </p:spPr>
+        <p:style>
+          <a:lnRef idx="1">
+            <a:schemeClr val="dk1"/>
+          </a:lnRef>
+          <a:fillRef idx="0">
+            <a:schemeClr val="dk1"/>
+          </a:fillRef>
+          <a:effectRef idx="0">
+            <a:schemeClr val="dk1"/>
+          </a:effectRef>
+          <a:fontRef idx="minor">
+            <a:schemeClr val="tx1"/>
+          </a:fontRef>
+        </p:style>
+      </p:cxnSp>
+      <p:cxnSp>
+        <p:nvCxnSpPr>
+          <p:cNvPr id="28" name="직선 화살표 연결선 27"/>
+          <p:cNvCxnSpPr>
+            <a:stCxn id="21" idx="3"/>
+            <a:endCxn id="8" idx="1"/>
+          </p:cNvCxnSpPr>
+          <p:nvPr/>
+        </p:nvCxnSpPr>
+        <p:spPr>
+          <a:xfrm>
+            <a:off x="2251299" y="4477265"/>
+            <a:ext cx="1453566" cy="656968"/>
+          </a:xfrm>
+          <a:prstGeom prst="straightConnector1">
+            <a:avLst/>
+          </a:prstGeom>
+          <a:ln>
+            <a:tailEnd type="triangle"/>
+          </a:ln>
+        </p:spPr>
+        <p:style>
+          <a:lnRef idx="1">
+            <a:schemeClr val="dk1"/>
+          </a:lnRef>
+          <a:fillRef idx="0">
+            <a:schemeClr val="dk1"/>
+          </a:fillRef>
+          <a:effectRef idx="0">
+            <a:schemeClr val="dk1"/>
+          </a:effectRef>
+          <a:fontRef idx="minor">
+            <a:schemeClr val="tx1"/>
+          </a:fontRef>
+        </p:style>
+      </p:cxnSp>
     </p:spTree>
     <p:extLst>
       <p:ext uri="{BB962C8B-B14F-4D97-AF65-F5344CB8AC3E}">
@@ -3562,11 +3941,15 @@
           <a:p>
             <a:r>
               <a:rPr lang="en-US" altLang="ko-KR" dirty="0" err="1" smtClean="0"/>
-              <a:t>BaseMalmServer</a:t>
+              <a:t>BaseMalm</a:t>
             </a:r>
             <a:r>
               <a:rPr lang="en-US" altLang="ko-KR" dirty="0" smtClean="0"/>
-              <a:t> architecture</a:t>
+              <a:t> </a:t>
+            </a:r>
+            <a:r>
+              <a:rPr lang="en-US" altLang="ko-KR" dirty="0" smtClean="0"/>
+              <a:t>architecture</a:t>
             </a:r>
             <a:endParaRPr lang="ko-KR" altLang="en-US" dirty="0"/>
           </a:p>

</xml_diff>